<commit_message>
saved final review as pdf
</commit_message>
<xml_diff>
--- a/_PowerPoints/2nd Semester/PreCalc_Day_078 Final Review.pptx
+++ b/_PowerPoints/2nd Semester/PreCalc_Day_078 Final Review.pptx
@@ -289,7 +289,7 @@
             <a:fld id="{87DE6118-2437-4B30-8E3C-4D2BE6020583}" type="datetimeFigureOut">
               <a:rPr lang="en-US" dirty="0"/>
               <a:pPr/>
-              <a:t>5/9/2018</a:t>
+              <a:t>5/10/2018</a:t>
             </a:fld>
             <a:endParaRPr lang="en-US" dirty="0"/>
           </a:p>
@@ -615,7 +615,7 @@
           <a:p>
             <a:fld id="{87DE6118-2437-4B30-8E3C-4D2BE6020583}" type="datetimeFigureOut">
               <a:rPr lang="en-US" dirty="0"/>
-              <a:t>5/9/2018</a:t>
+              <a:t>5/10/2018</a:t>
             </a:fld>
             <a:endParaRPr lang="en-US" dirty="0"/>
           </a:p>
@@ -790,7 +790,7 @@
           <a:p>
             <a:fld id="{87DE6118-2437-4B30-8E3C-4D2BE6020583}" type="datetimeFigureOut">
               <a:rPr lang="en-US" dirty="0"/>
-              <a:t>5/9/2018</a:t>
+              <a:t>5/10/2018</a:t>
             </a:fld>
             <a:endParaRPr lang="en-US" dirty="0"/>
           </a:p>
@@ -955,7 +955,7 @@
           <a:p>
             <a:fld id="{87DE6118-2437-4B30-8E3C-4D2BE6020583}" type="datetimeFigureOut">
               <a:rPr lang="en-US" dirty="0"/>
-              <a:t>5/9/2018</a:t>
+              <a:t>5/10/2018</a:t>
             </a:fld>
             <a:endParaRPr lang="en-US" dirty="0"/>
           </a:p>
@@ -1228,7 +1228,7 @@
             <a:fld id="{87DE6118-2437-4B30-8E3C-4D2BE6020583}" type="datetimeFigureOut">
               <a:rPr lang="en-US" dirty="0"/>
               <a:pPr/>
-              <a:t>5/9/2018</a:t>
+              <a:t>5/10/2018</a:t>
             </a:fld>
             <a:endParaRPr lang="en-US" dirty="0"/>
           </a:p>
@@ -1618,7 +1618,7 @@
           <a:p>
             <a:fld id="{87DE6118-2437-4B30-8E3C-4D2BE6020583}" type="datetimeFigureOut">
               <a:rPr lang="en-US" dirty="0"/>
-              <a:t>5/9/2018</a:t>
+              <a:t>5/10/2018</a:t>
             </a:fld>
             <a:endParaRPr lang="en-US" dirty="0"/>
           </a:p>
@@ -2090,7 +2090,7 @@
           <a:p>
             <a:fld id="{87DE6118-2437-4B30-8E3C-4D2BE6020583}" type="datetimeFigureOut">
               <a:rPr lang="en-US" dirty="0"/>
-              <a:t>5/9/2018</a:t>
+              <a:t>5/10/2018</a:t>
             </a:fld>
             <a:endParaRPr lang="en-US" dirty="0"/>
           </a:p>
@@ -2203,7 +2203,7 @@
           <a:p>
             <a:fld id="{87DE6118-2437-4B30-8E3C-4D2BE6020583}" type="datetimeFigureOut">
               <a:rPr lang="en-US" dirty="0"/>
-              <a:t>5/9/2018</a:t>
+              <a:t>5/10/2018</a:t>
             </a:fld>
             <a:endParaRPr lang="en-US" dirty="0"/>
           </a:p>
@@ -2293,7 +2293,7 @@
           <a:p>
             <a:fld id="{87DE6118-2437-4B30-8E3C-4D2BE6020583}" type="datetimeFigureOut">
               <a:rPr lang="en-US" dirty="0"/>
-              <a:t>5/9/2018</a:t>
+              <a:t>5/10/2018</a:t>
             </a:fld>
             <a:endParaRPr lang="en-US" dirty="0"/>
           </a:p>
@@ -2635,7 +2635,7 @@
             <a:fld id="{87DE6118-2437-4B30-8E3C-4D2BE6020583}" type="datetimeFigureOut">
               <a:rPr lang="en-US" dirty="0"/>
               <a:pPr/>
-              <a:t>5/9/2018</a:t>
+              <a:t>5/10/2018</a:t>
             </a:fld>
             <a:endParaRPr lang="en-US" dirty="0"/>
           </a:p>
@@ -3020,7 +3020,7 @@
             <a:fld id="{87DE6118-2437-4B30-8E3C-4D2BE6020583}" type="datetimeFigureOut">
               <a:rPr lang="en-US" dirty="0"/>
               <a:pPr/>
-              <a:t>5/9/2018</a:t>
+              <a:t>5/10/2018</a:t>
             </a:fld>
             <a:endParaRPr lang="en-US" dirty="0"/>
           </a:p>
@@ -3295,7 +3295,7 @@
             <a:fld id="{87DE6118-2437-4B30-8E3C-4D2BE6020583}" type="datetimeFigureOut">
               <a:rPr lang="en-US" dirty="0"/>
               <a:pPr/>
-              <a:t>5/9/2018</a:t>
+              <a:t>5/10/2018</a:t>
             </a:fld>
             <a:endParaRPr lang="en-US" dirty="0"/>
           </a:p>
@@ -3851,11 +3851,7 @@
           <a:p>
             <a:r>
               <a:rPr lang="en-US" dirty="0" smtClean="0"/>
-              <a:t>Day </a:t>
-            </a:r>
-            <a:r>
-              <a:rPr lang="en-US" dirty="0" smtClean="0"/>
-              <a:t>78</a:t>
+              <a:t>Day 78</a:t>
             </a:r>
             <a:endParaRPr lang="en-US" dirty="0"/>
           </a:p>
@@ -4099,7 +4095,6 @@
               <a:rPr lang="en-US" dirty="0"/>
               <a:t> </a:t>
             </a:r>
-            <a:endParaRPr lang="en-US" dirty="0"/>
           </a:p>
         </p:txBody>
       </p:sp>
@@ -4182,32 +4177,34 @@
         </p:nvSpPr>
         <p:spPr/>
         <p:txBody>
-          <a:bodyPr/>
+          <a:bodyPr>
+            <a:normAutofit/>
+          </a:bodyPr>
           <a:lstStyle/>
           <a:p>
             <a:pPr marL="0" indent="0">
               <a:buNone/>
             </a:pPr>
             <a:r>
-              <a:rPr lang="en-US" dirty="0" smtClean="0"/>
+              <a:rPr lang="en-US" sz="3000" dirty="0" smtClean="0"/>
               <a:t>Simplify</a:t>
             </a:r>
             <a:r>
-              <a:rPr lang="en-US" dirty="0"/>
+              <a:rPr lang="en-US" sz="3000" dirty="0"/>
               <a:t/>
             </a:r>
             <a:br>
-              <a:rPr lang="en-US" dirty="0"/>
+              <a:rPr lang="en-US" sz="3000" dirty="0"/>
             </a:br>
             <a:r>
-              <a:rPr lang="en-US" dirty="0"/>
+              <a:rPr lang="en-US" sz="3000" dirty="0"/>
               <a:t>Verify </a:t>
             </a:r>
             <a:br>
-              <a:rPr lang="en-US" dirty="0"/>
+              <a:rPr lang="en-US" sz="3000" dirty="0"/>
             </a:br>
             <a:r>
-              <a:rPr lang="en-US" dirty="0"/>
+              <a:rPr lang="en-US" sz="3000" dirty="0"/>
               <a:t>Evaluate other trig functions given tangent</a:t>
             </a:r>
           </a:p>
@@ -4221,8 +4218,8 @@
         </p:nvSpPr>
         <p:spPr>
           <a:xfrm>
-            <a:off x="2363232" y="4688506"/>
-            <a:ext cx="4751365" cy="369332"/>
+            <a:off x="1371600" y="4724792"/>
+            <a:ext cx="7831055" cy="553998"/>
           </a:xfrm>
           <a:prstGeom prst="rect">
             <a:avLst/>
@@ -4235,10 +4232,9 @@
           <a:lstStyle/>
           <a:p>
             <a:r>
-              <a:rPr lang="en-US" dirty="0"/>
+              <a:rPr lang="en-US" sz="3000" dirty="0"/>
               <a:t>Page 377 #1–6, 11, 15, 37, 43, 45, 47, 53, 75</a:t>
             </a:r>
-            <a:endParaRPr lang="en-US" dirty="0"/>
           </a:p>
         </p:txBody>
       </p:sp>
@@ -4309,8 +4305,8 @@
           </a:p>
         </p:txBody>
       </p:sp>
-      <mc:AlternateContent xmlns:mc="http://schemas.openxmlformats.org/markup-compatibility/2006">
-        <mc:Choice xmlns:a14="http://schemas.microsoft.com/office/drawing/2010/main" Requires="a14">
+      <mc:AlternateContent xmlns:mc="http://schemas.openxmlformats.org/markup-compatibility/2006" xmlns:a14="http://schemas.microsoft.com/office/drawing/2010/main">
+        <mc:Choice Requires="a14">
           <p:sp>
             <p:nvSpPr>
               <p:cNvPr id="3" name="Content Placeholder 2"/>
@@ -4372,7 +4368,7 @@
             </p:txBody>
           </p:sp>
         </mc:Choice>
-        <mc:Fallback>
+        <mc:Fallback xmlns="">
           <p:sp>
             <p:nvSpPr>
               <p:cNvPr id="3" name="Content Placeholder 2"/>
@@ -4431,7 +4427,6 @@
               <a:rPr lang="en-US" sz="3000" dirty="0"/>
               <a:t>Page 394 #5–17, 73 </a:t>
             </a:r>
-            <a:endParaRPr lang="en-US" sz="3000" dirty="0"/>
           </a:p>
         </p:txBody>
       </p:sp>
@@ -4445,6 +4440,13 @@
   <p:clrMapOvr>
     <a:masterClrMapping/>
   </p:clrMapOvr>
+  <p:timing>
+    <p:tnLst>
+      <p:par>
+        <p:cTn id="1" dur="indefinite" restart="never" nodeType="tmRoot"/>
+      </p:par>
+    </p:tnLst>
+  </p:timing>
 </p:sld>
 </file>
 
@@ -4729,7 +4731,6 @@
               <a:rPr lang="en-US" sz="3000" dirty="0"/>
               <a:t>bottom A22–A23, A25 #66–68     </a:t>
             </a:r>
-            <a:endParaRPr lang="en-US" sz="3000" dirty="0"/>
           </a:p>
         </p:txBody>
       </p:sp>

</xml_diff>